<commit_message>
update the ppt figures file
</commit_message>
<xml_diff>
--- a/figures/figures.pptx
+++ b/figures/figures.pptx
@@ -3362,339 +3362,438 @@
           <a:chExt cx="0" cy="0"/>
         </a:xfrm>
       </p:grpSpPr>
-      <p:pic>
-        <p:nvPicPr>
-          <p:cNvPr id="4" name="Picture 3" descr="motion_1.png"/>
-          <p:cNvPicPr>
-            <a:picLocks noChangeAspect="1"/>
-          </p:cNvPicPr>
+      <p:grpSp>
+        <p:nvGrpSpPr>
+          <p:cNvPr id="16" name="Group 15"/>
+          <p:cNvGrpSpPr/>
           <p:nvPr/>
-        </p:nvPicPr>
-        <p:blipFill>
-          <a:blip r:embed="rId2">
-            <a:extLst>
-              <a:ext uri="{28A0092B-C50C-407E-A947-70E740481C1C}">
-                <a14:useLocalDpi xmlns:a14="http://schemas.microsoft.com/office/drawing/2010/main" val="0"/>
-              </a:ext>
-            </a:extLst>
-          </a:blip>
-          <a:stretch>
-            <a:fillRect/>
-          </a:stretch>
-        </p:blipFill>
-        <p:spPr>
+        </p:nvGrpSpPr>
+        <p:grpSpPr>
           <a:xfrm>
-            <a:off x="1780829" y="829409"/>
-            <a:ext cx="9144000" cy="457200"/>
+            <a:off x="780100" y="829409"/>
+            <a:ext cx="10144729" cy="457200"/>
+            <a:chOff x="780100" y="829409"/>
+            <a:chExt cx="10144729" cy="457200"/>
           </a:xfrm>
-          <a:prstGeom prst="rect">
-            <a:avLst/>
-          </a:prstGeom>
-        </p:spPr>
-      </p:pic>
-      <p:sp>
-        <p:nvSpPr>
-          <p:cNvPr id="5" name="TextBox 4"/>
-          <p:cNvSpPr txBox="1"/>
-          <p:nvPr/>
-        </p:nvSpPr>
-        <p:spPr>
-          <a:xfrm>
-            <a:off x="735191" y="863119"/>
-            <a:ext cx="813394" cy="307777"/>
-          </a:xfrm>
-          <a:prstGeom prst="rect">
-            <a:avLst/>
-          </a:prstGeom>
-          <a:noFill/>
-        </p:spPr>
-        <p:txBody>
-          <a:bodyPr wrap="none" rtlCol="0">
-            <a:spAutoFit/>
-          </a:bodyPr>
-          <a:lstStyle/>
-          <a:p>
-            <a:pPr algn="ctr"/>
-            <a:r>
-              <a:rPr lang="en-US" sz="1400" dirty="0" smtClean="0">
+        </p:grpSpPr>
+        <p:pic>
+          <p:nvPicPr>
+            <p:cNvPr id="4" name="Picture 3" descr="motion_1.png"/>
+            <p:cNvPicPr>
+              <a:picLocks noChangeAspect="1"/>
+            </p:cNvPicPr>
+            <p:nvPr/>
+          </p:nvPicPr>
+          <p:blipFill>
+            <a:blip r:embed="rId2">
+              <a:extLst>
+                <a:ext uri="{28A0092B-C50C-407E-A947-70E740481C1C}">
+                  <a14:useLocalDpi xmlns:a14="http://schemas.microsoft.com/office/drawing/2010/main" val="0"/>
+                </a:ext>
+              </a:extLst>
+            </a:blip>
+            <a:stretch>
+              <a:fillRect/>
+            </a:stretch>
+          </p:blipFill>
+          <p:spPr>
+            <a:xfrm>
+              <a:off x="1780829" y="829409"/>
+              <a:ext cx="9144000" cy="457200"/>
+            </a:xfrm>
+            <a:prstGeom prst="rect">
+              <a:avLst/>
+            </a:prstGeom>
+          </p:spPr>
+        </p:pic>
+        <p:sp>
+          <p:nvSpPr>
+            <p:cNvPr id="5" name="TextBox 4"/>
+            <p:cNvSpPr txBox="1"/>
+            <p:nvPr/>
+          </p:nvSpPr>
+          <p:spPr>
+            <a:xfrm>
+              <a:off x="780100" y="863119"/>
+              <a:ext cx="723575" cy="276999"/>
+            </a:xfrm>
+            <a:prstGeom prst="rect">
+              <a:avLst/>
+            </a:prstGeom>
+            <a:noFill/>
+          </p:spPr>
+          <p:txBody>
+            <a:bodyPr wrap="none" rtlCol="0">
+              <a:spAutoFit/>
+            </a:bodyPr>
+            <a:lstStyle/>
+            <a:p>
+              <a:pPr algn="ctr"/>
+              <a:r>
+                <a:rPr lang="en-US" sz="1200" dirty="0" smtClean="0">
+                  <a:latin typeface="Helvetica"/>
+                  <a:cs typeface="Helvetica"/>
+                </a:rPr>
+                <a:t>nominal</a:t>
+              </a:r>
+              <a:endParaRPr lang="en-US" sz="1200" dirty="0">
                 <a:latin typeface="Helvetica"/>
                 <a:cs typeface="Helvetica"/>
-              </a:rPr>
-              <a:t>nominal</a:t>
-            </a:r>
-            <a:endParaRPr lang="en-US" sz="1400" dirty="0">
-              <a:latin typeface="Helvetica"/>
-              <a:cs typeface="Helvetica"/>
-            </a:endParaRPr>
-          </a:p>
-        </p:txBody>
-      </p:sp>
-      <p:sp>
-        <p:nvSpPr>
-          <p:cNvPr id="6" name="TextBox 5"/>
-          <p:cNvSpPr txBox="1"/>
+              </a:endParaRPr>
+            </a:p>
+          </p:txBody>
+        </p:sp>
+      </p:grpSp>
+      <p:grpSp>
+        <p:nvGrpSpPr>
+          <p:cNvPr id="21" name="Group 20"/>
+          <p:cNvGrpSpPr/>
           <p:nvPr/>
-        </p:nvSpPr>
-        <p:spPr>
+        </p:nvGrpSpPr>
+        <p:grpSpPr>
           <a:xfrm>
-            <a:off x="670410" y="1618588"/>
-            <a:ext cx="942961" cy="523220"/>
+            <a:off x="835705" y="2957364"/>
+            <a:ext cx="10089124" cy="523220"/>
+            <a:chOff x="835705" y="4715994"/>
+            <a:chExt cx="10089124" cy="523220"/>
           </a:xfrm>
-          <a:prstGeom prst="rect">
-            <a:avLst/>
-          </a:prstGeom>
-          <a:noFill/>
-        </p:spPr>
-        <p:txBody>
-          <a:bodyPr wrap="none" rtlCol="0">
-            <a:spAutoFit/>
-          </a:bodyPr>
-          <a:lstStyle/>
-          <a:p>
-            <a:pPr algn="ctr"/>
-            <a:r>
-              <a:rPr lang="en-US" sz="1400" dirty="0" smtClean="0">
+        </p:grpSpPr>
+        <p:sp>
+          <p:nvSpPr>
+            <p:cNvPr id="9" name="TextBox 8"/>
+            <p:cNvSpPr txBox="1"/>
+            <p:nvPr/>
+          </p:nvSpPr>
+          <p:spPr>
+            <a:xfrm>
+              <a:off x="835705" y="4715994"/>
+              <a:ext cx="612367" cy="461665"/>
+            </a:xfrm>
+            <a:prstGeom prst="rect">
+              <a:avLst/>
+            </a:prstGeom>
+            <a:noFill/>
+          </p:spPr>
+          <p:txBody>
+            <a:bodyPr wrap="none" rtlCol="0">
+              <a:spAutoFit/>
+            </a:bodyPr>
+            <a:lstStyle/>
+            <a:p>
+              <a:pPr algn="ctr"/>
+              <a:r>
+                <a:rPr lang="en-US" sz="1200" dirty="0" smtClean="0">
+                  <a:latin typeface="Helvetica"/>
+                  <a:cs typeface="Helvetica"/>
+                </a:rPr>
+                <a:t>robust</a:t>
+              </a:r>
+            </a:p>
+            <a:p>
+              <a:pPr algn="ctr"/>
+              <a:r>
+                <a:rPr lang="en-US" sz="1200" dirty="0" smtClean="0">
+                  <a:latin typeface="Helvetica"/>
+                  <a:cs typeface="Helvetica"/>
+                </a:rPr>
+                <a:t>agent</a:t>
+              </a:r>
+              <a:endParaRPr lang="en-US" sz="1200" dirty="0">
                 <a:latin typeface="Helvetica"/>
                 <a:cs typeface="Helvetica"/>
-              </a:rPr>
-              <a:t>dynamics</a:t>
-            </a:r>
-          </a:p>
-          <a:p>
-            <a:pPr algn="ctr"/>
-            <a:r>
-              <a:rPr lang="en-US" sz="1400" dirty="0" smtClean="0">
+              </a:endParaRPr>
+            </a:p>
+          </p:txBody>
+        </p:sp>
+        <p:pic>
+          <p:nvPicPr>
+            <p:cNvPr id="11" name="Picture 10"/>
+            <p:cNvPicPr>
+              <a:picLocks noChangeAspect="1"/>
+            </p:cNvPicPr>
+            <p:nvPr/>
+          </p:nvPicPr>
+          <p:blipFill>
+            <a:blip r:embed="rId3"/>
+            <a:stretch>
+              <a:fillRect/>
+            </a:stretch>
+          </p:blipFill>
+          <p:spPr>
+            <a:xfrm>
+              <a:off x="1780829" y="4782014"/>
+              <a:ext cx="9144000" cy="457200"/>
+            </a:xfrm>
+            <a:prstGeom prst="rect">
+              <a:avLst/>
+            </a:prstGeom>
+          </p:spPr>
+        </p:pic>
+      </p:grpSp>
+      <p:grpSp>
+        <p:nvGrpSpPr>
+          <p:cNvPr id="17" name="Group 16"/>
+          <p:cNvGrpSpPr/>
+          <p:nvPr/>
+        </p:nvGrpSpPr>
+        <p:grpSpPr>
+          <a:xfrm>
+            <a:off x="724573" y="1311883"/>
+            <a:ext cx="10200256" cy="490210"/>
+            <a:chOff x="724573" y="1618588"/>
+            <a:chExt cx="10200256" cy="490210"/>
+          </a:xfrm>
+        </p:grpSpPr>
+        <p:sp>
+          <p:nvSpPr>
+            <p:cNvPr id="6" name="TextBox 5"/>
+            <p:cNvSpPr txBox="1"/>
+            <p:nvPr/>
+          </p:nvSpPr>
+          <p:spPr>
+            <a:xfrm>
+              <a:off x="724573" y="1618588"/>
+              <a:ext cx="834634" cy="461665"/>
+            </a:xfrm>
+            <a:prstGeom prst="rect">
+              <a:avLst/>
+            </a:prstGeom>
+            <a:noFill/>
+          </p:spPr>
+          <p:txBody>
+            <a:bodyPr wrap="none" rtlCol="0">
+              <a:spAutoFit/>
+            </a:bodyPr>
+            <a:lstStyle/>
+            <a:p>
+              <a:pPr algn="ctr"/>
+              <a:r>
+                <a:rPr lang="en-US" sz="1200" dirty="0" smtClean="0">
+                  <a:latin typeface="Helvetica"/>
+                  <a:cs typeface="Helvetica"/>
+                </a:rPr>
+                <a:t>dynamics</a:t>
+              </a:r>
+            </a:p>
+            <a:p>
+              <a:pPr algn="ctr"/>
+              <a:r>
+                <a:rPr lang="en-US" sz="1200" dirty="0" smtClean="0">
+                  <a:latin typeface="Helvetica"/>
+                  <a:cs typeface="Helvetica"/>
+                </a:rPr>
+                <a:t>noise</a:t>
+              </a:r>
+              <a:endParaRPr lang="en-US" sz="1200" dirty="0">
                 <a:latin typeface="Helvetica"/>
                 <a:cs typeface="Helvetica"/>
-              </a:rPr>
-              <a:t>noise</a:t>
-            </a:r>
-            <a:endParaRPr lang="en-US" sz="1400" dirty="0">
-              <a:latin typeface="Helvetica"/>
-              <a:cs typeface="Helvetica"/>
-            </a:endParaRPr>
-          </a:p>
-        </p:txBody>
-      </p:sp>
-      <p:sp>
-        <p:nvSpPr>
-          <p:cNvPr id="7" name="TextBox 6"/>
-          <p:cNvSpPr txBox="1"/>
+              </a:endParaRPr>
+            </a:p>
+          </p:txBody>
+        </p:sp>
+        <p:pic>
+          <p:nvPicPr>
+            <p:cNvPr id="13" name="Picture 12"/>
+            <p:cNvPicPr>
+              <a:picLocks noChangeAspect="1"/>
+            </p:cNvPicPr>
+            <p:nvPr/>
+          </p:nvPicPr>
+          <p:blipFill>
+            <a:blip r:embed="rId4"/>
+            <a:stretch>
+              <a:fillRect/>
+            </a:stretch>
+          </p:blipFill>
+          <p:spPr>
+            <a:xfrm>
+              <a:off x="1780829" y="1651598"/>
+              <a:ext cx="9144000" cy="457200"/>
+            </a:xfrm>
+            <a:prstGeom prst="rect">
+              <a:avLst/>
+            </a:prstGeom>
+          </p:spPr>
+        </p:pic>
+      </p:grpSp>
+      <p:grpSp>
+        <p:nvGrpSpPr>
+          <p:cNvPr id="18" name="Group 17"/>
+          <p:cNvGrpSpPr/>
           <p:nvPr/>
-        </p:nvSpPr>
-        <p:spPr>
+        </p:nvGrpSpPr>
+        <p:grpSpPr>
           <a:xfrm>
-            <a:off x="735236" y="2651056"/>
-            <a:ext cx="813306" cy="523220"/>
+            <a:off x="780139" y="1860377"/>
+            <a:ext cx="10144690" cy="490210"/>
+            <a:chOff x="780139" y="2651056"/>
+            <a:chExt cx="10144690" cy="490210"/>
           </a:xfrm>
-          <a:prstGeom prst="rect">
-            <a:avLst/>
-          </a:prstGeom>
-          <a:noFill/>
-        </p:spPr>
-        <p:txBody>
-          <a:bodyPr wrap="none" rtlCol="0">
-            <a:spAutoFit/>
-          </a:bodyPr>
-          <a:lstStyle/>
-          <a:p>
-            <a:pPr algn="ctr"/>
-            <a:r>
-              <a:rPr lang="en-US" sz="1400" dirty="0" smtClean="0">
+        </p:grpSpPr>
+        <p:sp>
+          <p:nvSpPr>
+            <p:cNvPr id="7" name="TextBox 6"/>
+            <p:cNvSpPr txBox="1"/>
+            <p:nvPr/>
+          </p:nvSpPr>
+          <p:spPr>
+            <a:xfrm>
+              <a:off x="780139" y="2651056"/>
+              <a:ext cx="723500" cy="461665"/>
+            </a:xfrm>
+            <a:prstGeom prst="rect">
+              <a:avLst/>
+            </a:prstGeom>
+            <a:noFill/>
+          </p:spPr>
+          <p:txBody>
+            <a:bodyPr wrap="none" rtlCol="0">
+              <a:spAutoFit/>
+            </a:bodyPr>
+            <a:lstStyle/>
+            <a:p>
+              <a:pPr algn="ctr"/>
+              <a:r>
+                <a:rPr lang="en-US" sz="1200" dirty="0" smtClean="0">
+                  <a:latin typeface="Helvetica"/>
+                  <a:cs typeface="Helvetica"/>
+                </a:rPr>
+                <a:t>process</a:t>
+              </a:r>
+            </a:p>
+            <a:p>
+              <a:pPr algn="ctr"/>
+              <a:r>
+                <a:rPr lang="en-US" sz="1200" dirty="0" smtClean="0">
+                  <a:latin typeface="Helvetica"/>
+                  <a:cs typeface="Helvetica"/>
+                </a:rPr>
+                <a:t>noise</a:t>
+              </a:r>
+              <a:endParaRPr lang="en-US" sz="1200" dirty="0">
                 <a:latin typeface="Helvetica"/>
                 <a:cs typeface="Helvetica"/>
-              </a:rPr>
-              <a:t>process</a:t>
-            </a:r>
-          </a:p>
-          <a:p>
-            <a:pPr algn="ctr"/>
-            <a:r>
-              <a:rPr lang="en-US" sz="1400" dirty="0" smtClean="0">
+              </a:endParaRPr>
+            </a:p>
+          </p:txBody>
+        </p:sp>
+        <p:pic>
+          <p:nvPicPr>
+            <p:cNvPr id="14" name="Picture 13" descr="motion.png"/>
+            <p:cNvPicPr>
+              <a:picLocks noChangeAspect="1"/>
+            </p:cNvPicPr>
+            <p:nvPr/>
+          </p:nvPicPr>
+          <p:blipFill>
+            <a:blip r:embed="rId5">
+              <a:extLst>
+                <a:ext uri="{28A0092B-C50C-407E-A947-70E740481C1C}">
+                  <a14:useLocalDpi xmlns:a14="http://schemas.microsoft.com/office/drawing/2010/main" val="0"/>
+                </a:ext>
+              </a:extLst>
+            </a:blip>
+            <a:stretch>
+              <a:fillRect/>
+            </a:stretch>
+          </p:blipFill>
+          <p:spPr>
+            <a:xfrm>
+              <a:off x="1780829" y="2684066"/>
+              <a:ext cx="9144000" cy="457200"/>
+            </a:xfrm>
+            <a:prstGeom prst="rect">
+              <a:avLst/>
+            </a:prstGeom>
+          </p:spPr>
+        </p:pic>
+      </p:grpSp>
+      <p:grpSp>
+        <p:nvGrpSpPr>
+          <p:cNvPr id="19" name="Group 18"/>
+          <p:cNvGrpSpPr/>
+          <p:nvPr/>
+        </p:nvGrpSpPr>
+        <p:grpSpPr>
+          <a:xfrm>
+            <a:off x="651760" y="2408871"/>
+            <a:ext cx="10273069" cy="490210"/>
+            <a:chOff x="651760" y="3683524"/>
+            <a:chExt cx="10273069" cy="490210"/>
+          </a:xfrm>
+        </p:grpSpPr>
+        <p:sp>
+          <p:nvSpPr>
+            <p:cNvPr id="8" name="TextBox 7"/>
+            <p:cNvSpPr txBox="1"/>
+            <p:nvPr/>
+          </p:nvSpPr>
+          <p:spPr>
+            <a:xfrm>
+              <a:off x="651760" y="3683524"/>
+              <a:ext cx="980256" cy="461665"/>
+            </a:xfrm>
+            <a:prstGeom prst="rect">
+              <a:avLst/>
+            </a:prstGeom>
+            <a:noFill/>
+          </p:spPr>
+          <p:txBody>
+            <a:bodyPr wrap="none" rtlCol="0">
+              <a:spAutoFit/>
+            </a:bodyPr>
+            <a:lstStyle/>
+            <a:p>
+              <a:pPr algn="ctr"/>
+              <a:r>
+                <a:rPr lang="en-US" sz="1200" dirty="0" smtClean="0">
+                  <a:latin typeface="Helvetica"/>
+                  <a:cs typeface="Helvetica"/>
+                </a:rPr>
+                <a:t>observation</a:t>
+              </a:r>
+            </a:p>
+            <a:p>
+              <a:pPr algn="ctr"/>
+              <a:r>
+                <a:rPr lang="en-US" sz="1200" dirty="0" smtClean="0">
+                  <a:latin typeface="Helvetica"/>
+                  <a:cs typeface="Helvetica"/>
+                </a:rPr>
+                <a:t>noise</a:t>
+              </a:r>
+              <a:endParaRPr lang="en-US" sz="1200" dirty="0">
                 <a:latin typeface="Helvetica"/>
                 <a:cs typeface="Helvetica"/>
-              </a:rPr>
-              <a:t>noise</a:t>
-            </a:r>
-            <a:endParaRPr lang="en-US" sz="1400" dirty="0">
-              <a:latin typeface="Helvetica"/>
-              <a:cs typeface="Helvetica"/>
-            </a:endParaRPr>
-          </a:p>
-        </p:txBody>
-      </p:sp>
-      <p:sp>
-        <p:nvSpPr>
-          <p:cNvPr id="8" name="TextBox 7"/>
-          <p:cNvSpPr txBox="1"/>
-          <p:nvPr/>
-        </p:nvSpPr>
-        <p:spPr>
-          <a:xfrm>
-            <a:off x="585461" y="3683524"/>
-            <a:ext cx="1112855" cy="523220"/>
-          </a:xfrm>
-          <a:prstGeom prst="rect">
-            <a:avLst/>
-          </a:prstGeom>
-          <a:noFill/>
-        </p:spPr>
-        <p:txBody>
-          <a:bodyPr wrap="none" rtlCol="0">
-            <a:spAutoFit/>
-          </a:bodyPr>
-          <a:lstStyle/>
-          <a:p>
-            <a:pPr algn="ctr"/>
-            <a:r>
-              <a:rPr lang="en-US" sz="1400" dirty="0" smtClean="0">
-                <a:latin typeface="Helvetica"/>
-                <a:cs typeface="Helvetica"/>
-              </a:rPr>
-              <a:t>observation</a:t>
-            </a:r>
-          </a:p>
-          <a:p>
-            <a:pPr algn="ctr"/>
-            <a:r>
-              <a:rPr lang="en-US" sz="1400" dirty="0" smtClean="0">
-                <a:latin typeface="Helvetica"/>
-                <a:cs typeface="Helvetica"/>
-              </a:rPr>
-              <a:t>noise</a:t>
-            </a:r>
-            <a:endParaRPr lang="en-US" sz="1400" dirty="0">
-              <a:latin typeface="Helvetica"/>
-              <a:cs typeface="Helvetica"/>
-            </a:endParaRPr>
-          </a:p>
-        </p:txBody>
-      </p:sp>
-      <p:sp>
-        <p:nvSpPr>
-          <p:cNvPr id="9" name="TextBox 8"/>
-          <p:cNvSpPr txBox="1"/>
-          <p:nvPr/>
-        </p:nvSpPr>
-        <p:spPr>
-          <a:xfrm>
-            <a:off x="800063" y="4715994"/>
-            <a:ext cx="683651" cy="523220"/>
-          </a:xfrm>
-          <a:prstGeom prst="rect">
-            <a:avLst/>
-          </a:prstGeom>
-          <a:noFill/>
-        </p:spPr>
-        <p:txBody>
-          <a:bodyPr wrap="none" rtlCol="0">
-            <a:spAutoFit/>
-          </a:bodyPr>
-          <a:lstStyle/>
-          <a:p>
-            <a:pPr algn="ctr"/>
-            <a:r>
-              <a:rPr lang="en-US" sz="1400" dirty="0" smtClean="0">
-                <a:latin typeface="Helvetica"/>
-                <a:cs typeface="Helvetica"/>
-              </a:rPr>
-              <a:t>robust</a:t>
-            </a:r>
-          </a:p>
-          <a:p>
-            <a:pPr algn="ctr"/>
-            <a:r>
-              <a:rPr lang="en-US" sz="1400" dirty="0" smtClean="0">
-                <a:latin typeface="Helvetica"/>
-                <a:cs typeface="Helvetica"/>
-              </a:rPr>
-              <a:t>agent</a:t>
-            </a:r>
-            <a:endParaRPr lang="en-US" sz="1400" dirty="0">
-              <a:latin typeface="Helvetica"/>
-              <a:cs typeface="Helvetica"/>
-            </a:endParaRPr>
-          </a:p>
-        </p:txBody>
-      </p:sp>
-      <p:pic>
-        <p:nvPicPr>
-          <p:cNvPr id="11" name="Picture 10"/>
-          <p:cNvPicPr>
-            <a:picLocks noChangeAspect="1"/>
-          </p:cNvPicPr>
-          <p:nvPr/>
-        </p:nvPicPr>
-        <p:blipFill>
-          <a:blip r:embed="rId3"/>
-          <a:stretch>
-            <a:fillRect/>
-          </a:stretch>
-        </p:blipFill>
-        <p:spPr>
-          <a:xfrm>
-            <a:off x="1780829" y="4782014"/>
-            <a:ext cx="9144000" cy="457200"/>
-          </a:xfrm>
-          <a:prstGeom prst="rect">
-            <a:avLst/>
-          </a:prstGeom>
-        </p:spPr>
-      </p:pic>
-      <p:pic>
-        <p:nvPicPr>
-          <p:cNvPr id="13" name="Picture 12"/>
-          <p:cNvPicPr>
-            <a:picLocks noChangeAspect="1"/>
-          </p:cNvPicPr>
-          <p:nvPr/>
-        </p:nvPicPr>
-        <p:blipFill>
-          <a:blip r:embed="rId4"/>
-          <a:stretch>
-            <a:fillRect/>
-          </a:stretch>
-        </p:blipFill>
-        <p:spPr>
-          <a:xfrm>
-            <a:off x="1780829" y="3716534"/>
-            <a:ext cx="9144000" cy="457200"/>
-          </a:xfrm>
-          <a:prstGeom prst="rect">
-            <a:avLst/>
-          </a:prstGeom>
-        </p:spPr>
-      </p:pic>
-      <p:pic>
-        <p:nvPicPr>
-          <p:cNvPr id="14" name="Picture 13" descr="motion.png"/>
-          <p:cNvPicPr>
-            <a:picLocks noChangeAspect="1"/>
-          </p:cNvPicPr>
-          <p:nvPr/>
-        </p:nvPicPr>
-        <p:blipFill>
-          <a:blip r:embed="rId5">
-            <a:extLst>
-              <a:ext uri="{28A0092B-C50C-407E-A947-70E740481C1C}">
-                <a14:useLocalDpi xmlns:a14="http://schemas.microsoft.com/office/drawing/2010/main" val="0"/>
-              </a:ext>
-            </a:extLst>
-          </a:blip>
-          <a:stretch>
-            <a:fillRect/>
-          </a:stretch>
-        </p:blipFill>
-        <p:spPr>
-          <a:xfrm>
-            <a:off x="1780829" y="1651598"/>
-            <a:ext cx="9144000" cy="457200"/>
-          </a:xfrm>
-          <a:prstGeom prst="rect">
-            <a:avLst/>
-          </a:prstGeom>
-        </p:spPr>
-      </p:pic>
+              </a:endParaRPr>
+            </a:p>
+          </p:txBody>
+        </p:sp>
+        <p:pic>
+          <p:nvPicPr>
+            <p:cNvPr id="15" name="Picture 14"/>
+            <p:cNvPicPr>
+              <a:picLocks noChangeAspect="1"/>
+            </p:cNvPicPr>
+            <p:nvPr/>
+          </p:nvPicPr>
+          <p:blipFill>
+            <a:blip r:embed="rId6"/>
+            <a:stretch>
+              <a:fillRect/>
+            </a:stretch>
+          </p:blipFill>
+          <p:spPr>
+            <a:xfrm>
+              <a:off x="1780829" y="3716534"/>
+              <a:ext cx="9144000" cy="457200"/>
+            </a:xfrm>
+            <a:prstGeom prst="rect">
+              <a:avLst/>
+            </a:prstGeom>
+          </p:spPr>
+        </p:pic>
+      </p:grpSp>
     </p:spTree>
     <p:extLst>
       <p:ext uri="{BB962C8B-B14F-4D97-AF65-F5344CB8AC3E}">

</xml_diff>